<commit_message>
update README, travis.yml, imple,,
</commit_message>
<xml_diff>
--- a/etc/thread_manager.pptx
+++ b/etc/thread_manager.pptx
@@ -106,6 +106,22 @@
       </a:defRPr>
     </a:lvl9pPr>
   </p:defaultTextStyle>
+  <p:extLst>
+    <p:ext uri="{EFAFB233-063F-42B5-8137-9DF3F51BA10A}">
+      <p15:sldGuideLst xmlns:p15="http://schemas.microsoft.com/office/powerpoint/2012/main">
+        <p15:guide id="1" orient="horz" pos="2160">
+          <p15:clr>
+            <a:srgbClr val="A4A3A4"/>
+          </p15:clr>
+        </p15:guide>
+        <p15:guide id="2" pos="2880">
+          <p15:clr>
+            <a:srgbClr val="A4A3A4"/>
+          </p15:clr>
+        </p15:guide>
+      </p15:sldGuideLst>
+    </p:ext>
+  </p:extLst>
 </p:presentation>
 </file>
 
@@ -290,7 +306,7 @@
           <a:p>
             <a:fld id="{96CB86D3-7B57-4351-8487-129B39CE012B}" type="datetimeFigureOut">
               <a:rPr kumimoji="1" lang="ja-JP" altLang="en-US" smtClean="0"/>
-              <a:t>2017/2/10</a:t>
+              <a:t>2020/5/23</a:t>
             </a:fld>
             <a:endParaRPr kumimoji="1" lang="ja-JP" altLang="en-US"/>
           </a:p>
@@ -492,7 +508,7 @@
           <a:p>
             <a:fld id="{96CB86D3-7B57-4351-8487-129B39CE012B}" type="datetimeFigureOut">
               <a:rPr kumimoji="1" lang="ja-JP" altLang="en-US" smtClean="0"/>
-              <a:t>2017/2/10</a:t>
+              <a:t>2020/5/23</a:t>
             </a:fld>
             <a:endParaRPr kumimoji="1" lang="ja-JP" altLang="en-US"/>
           </a:p>
@@ -704,7 +720,7 @@
           <a:p>
             <a:fld id="{96CB86D3-7B57-4351-8487-129B39CE012B}" type="datetimeFigureOut">
               <a:rPr kumimoji="1" lang="ja-JP" altLang="en-US" smtClean="0"/>
-              <a:t>2017/2/10</a:t>
+              <a:t>2020/5/23</a:t>
             </a:fld>
             <a:endParaRPr kumimoji="1" lang="ja-JP" altLang="en-US"/>
           </a:p>
@@ -906,7 +922,7 @@
           <a:p>
             <a:fld id="{96CB86D3-7B57-4351-8487-129B39CE012B}" type="datetimeFigureOut">
               <a:rPr kumimoji="1" lang="ja-JP" altLang="en-US" smtClean="0"/>
-              <a:t>2017/2/10</a:t>
+              <a:t>2020/5/23</a:t>
             </a:fld>
             <a:endParaRPr kumimoji="1" lang="ja-JP" altLang="en-US"/>
           </a:p>
@@ -1152,7 +1168,7 @@
           <a:p>
             <a:fld id="{96CB86D3-7B57-4351-8487-129B39CE012B}" type="datetimeFigureOut">
               <a:rPr kumimoji="1" lang="ja-JP" altLang="en-US" smtClean="0"/>
-              <a:t>2017/2/10</a:t>
+              <a:t>2020/5/23</a:t>
             </a:fld>
             <a:endParaRPr kumimoji="1" lang="ja-JP" altLang="en-US"/>
           </a:p>
@@ -1504,7 +1520,7 @@
           <a:p>
             <a:fld id="{96CB86D3-7B57-4351-8487-129B39CE012B}" type="datetimeFigureOut">
               <a:rPr kumimoji="1" lang="ja-JP" altLang="en-US" smtClean="0"/>
-              <a:t>2017/2/10</a:t>
+              <a:t>2020/5/23</a:t>
             </a:fld>
             <a:endParaRPr kumimoji="1" lang="ja-JP" altLang="en-US"/>
           </a:p>
@@ -1990,7 +2006,7 @@
           <a:p>
             <a:fld id="{96CB86D3-7B57-4351-8487-129B39CE012B}" type="datetimeFigureOut">
               <a:rPr kumimoji="1" lang="ja-JP" altLang="en-US" smtClean="0"/>
-              <a:t>2017/2/10</a:t>
+              <a:t>2020/5/23</a:t>
             </a:fld>
             <a:endParaRPr kumimoji="1" lang="ja-JP" altLang="en-US"/>
           </a:p>
@@ -2108,7 +2124,7 @@
           <a:p>
             <a:fld id="{96CB86D3-7B57-4351-8487-129B39CE012B}" type="datetimeFigureOut">
               <a:rPr kumimoji="1" lang="ja-JP" altLang="en-US" smtClean="0"/>
-              <a:t>2017/2/10</a:t>
+              <a:t>2020/5/23</a:t>
             </a:fld>
             <a:endParaRPr kumimoji="1" lang="ja-JP" altLang="en-US"/>
           </a:p>
@@ -2203,7 +2219,7 @@
           <a:p>
             <a:fld id="{96CB86D3-7B57-4351-8487-129B39CE012B}" type="datetimeFigureOut">
               <a:rPr kumimoji="1" lang="ja-JP" altLang="en-US" smtClean="0"/>
-              <a:t>2017/2/10</a:t>
+              <a:t>2020/5/23</a:t>
             </a:fld>
             <a:endParaRPr kumimoji="1" lang="ja-JP" altLang="en-US"/>
           </a:p>
@@ -2512,7 +2528,7 @@
           <a:p>
             <a:fld id="{96CB86D3-7B57-4351-8487-129B39CE012B}" type="datetimeFigureOut">
               <a:rPr kumimoji="1" lang="ja-JP" altLang="en-US" smtClean="0"/>
-              <a:t>2017/2/10</a:t>
+              <a:t>2020/5/23</a:t>
             </a:fld>
             <a:endParaRPr kumimoji="1" lang="ja-JP" altLang="en-US"/>
           </a:p>
@@ -2765,7 +2781,7 @@
           <a:p>
             <a:fld id="{96CB86D3-7B57-4351-8487-129B39CE012B}" type="datetimeFigureOut">
               <a:rPr kumimoji="1" lang="ja-JP" altLang="en-US" smtClean="0"/>
-              <a:t>2017/2/10</a:t>
+              <a:t>2020/5/23</a:t>
             </a:fld>
             <a:endParaRPr kumimoji="1" lang="ja-JP" altLang="en-US"/>
           </a:p>
@@ -3010,7 +3026,7 @@
           <a:p>
             <a:fld id="{96CB86D3-7B57-4351-8487-129B39CE012B}" type="datetimeFigureOut">
               <a:rPr kumimoji="1" lang="ja-JP" altLang="en-US" smtClean="0"/>
-              <a:t>2017/2/10</a:t>
+              <a:t>2020/5/23</a:t>
             </a:fld>
             <a:endParaRPr kumimoji="1" lang="ja-JP" altLang="en-US"/>
           </a:p>
@@ -3393,7 +3409,7 @@
         </p:nvSpPr>
         <p:spPr>
           <a:xfrm>
-            <a:off x="1115616" y="2977206"/>
+            <a:off x="1691680" y="2977206"/>
             <a:ext cx="5616624" cy="3476129"/>
           </a:xfrm>
           <a:prstGeom prst="rect">
@@ -3442,7 +3458,7 @@
         </p:nvSpPr>
         <p:spPr>
           <a:xfrm>
-            <a:off x="5088325" y="3969060"/>
+            <a:off x="5664389" y="3969060"/>
             <a:ext cx="1499899" cy="1692188"/>
           </a:xfrm>
           <a:prstGeom prst="rect">
@@ -3488,7 +3504,7 @@
         </p:nvSpPr>
         <p:spPr>
           <a:xfrm>
-            <a:off x="4872301" y="3897052"/>
+            <a:off x="5448365" y="3897052"/>
             <a:ext cx="1499899" cy="1692188"/>
           </a:xfrm>
           <a:prstGeom prst="rect">
@@ -3534,7 +3550,7 @@
         </p:nvSpPr>
         <p:spPr>
           <a:xfrm>
-            <a:off x="4512261" y="3789040"/>
+            <a:off x="5088325" y="3789040"/>
             <a:ext cx="1499899" cy="1692188"/>
           </a:xfrm>
           <a:prstGeom prst="rect">
@@ -3577,7 +3593,7 @@
         </p:nvSpPr>
         <p:spPr>
           <a:xfrm>
-            <a:off x="3792181" y="3681028"/>
+            <a:off x="4368245" y="3681028"/>
             <a:ext cx="1499899" cy="1692188"/>
           </a:xfrm>
           <a:prstGeom prst="rect">
@@ -3620,7 +3636,7 @@
         </p:nvSpPr>
         <p:spPr>
           <a:xfrm>
-            <a:off x="4209964" y="4629777"/>
+            <a:off x="4786028" y="4629777"/>
             <a:ext cx="664331" cy="597419"/>
           </a:xfrm>
           <a:prstGeom prst="rect">
@@ -3676,7 +3692,7 @@
         </p:nvSpPr>
         <p:spPr>
           <a:xfrm>
-            <a:off x="827584" y="188640"/>
+            <a:off x="1403648" y="188640"/>
             <a:ext cx="6192688" cy="6552728"/>
           </a:xfrm>
           <a:prstGeom prst="rect">
@@ -3722,7 +3738,7 @@
         </p:nvSpPr>
         <p:spPr>
           <a:xfrm>
-            <a:off x="35496" y="34751"/>
+            <a:off x="611560" y="34751"/>
             <a:ext cx="871072" cy="307777"/>
           </a:xfrm>
           <a:prstGeom prst="rect">
@@ -3752,7 +3768,7 @@
         </p:nvSpPr>
         <p:spPr>
           <a:xfrm>
-            <a:off x="1123260" y="2977207"/>
+            <a:off x="1699324" y="2977207"/>
             <a:ext cx="1407116" cy="307777"/>
           </a:xfrm>
           <a:prstGeom prst="rect">
@@ -3786,7 +3802,7 @@
         </p:nvSpPr>
         <p:spPr>
           <a:xfrm>
-            <a:off x="4067944" y="4120603"/>
+            <a:off x="4644008" y="4120603"/>
             <a:ext cx="1008112" cy="396901"/>
           </a:xfrm>
           <a:prstGeom prst="rect">
@@ -3844,7 +3860,7 @@
         </p:nvSpPr>
         <p:spPr>
           <a:xfrm>
-            <a:off x="1496309" y="5661248"/>
+            <a:off x="2072373" y="5661248"/>
             <a:ext cx="1499899" cy="648072"/>
           </a:xfrm>
           <a:prstGeom prst="rect">
@@ -3887,7 +3903,7 @@
         </p:nvSpPr>
         <p:spPr>
           <a:xfrm>
-            <a:off x="1731900" y="5720556"/>
+            <a:off x="2307964" y="5720556"/>
             <a:ext cx="1039900" cy="523220"/>
           </a:xfrm>
           <a:prstGeom prst="rect">
@@ -3932,7 +3948,7 @@
         </p:nvSpPr>
         <p:spPr>
           <a:xfrm>
-            <a:off x="3203848" y="5661248"/>
+            <a:off x="3779912" y="5661248"/>
             <a:ext cx="1499899" cy="648072"/>
           </a:xfrm>
           <a:prstGeom prst="rect">
@@ -3975,7 +3991,7 @@
         </p:nvSpPr>
         <p:spPr>
           <a:xfrm>
-            <a:off x="3439439" y="5720556"/>
+            <a:off x="4015503" y="5720556"/>
             <a:ext cx="1211037" cy="523220"/>
           </a:xfrm>
           <a:prstGeom prst="rect">
@@ -4024,7 +4040,7 @@
         </p:nvSpPr>
         <p:spPr>
           <a:xfrm>
-            <a:off x="3779912" y="3661792"/>
+            <a:off x="4355976" y="3661792"/>
             <a:ext cx="1210396" cy="523220"/>
           </a:xfrm>
           <a:prstGeom prst="rect">
@@ -4073,7 +4089,7 @@
         </p:nvSpPr>
         <p:spPr>
           <a:xfrm>
-            <a:off x="2568045" y="3539563"/>
+            <a:off x="3144109" y="3539563"/>
             <a:ext cx="1499899" cy="1692188"/>
           </a:xfrm>
           <a:prstGeom prst="rect">
@@ -4116,7 +4132,7 @@
         </p:nvSpPr>
         <p:spPr>
           <a:xfrm>
-            <a:off x="3000093" y="4511671"/>
+            <a:off x="3576157" y="4511671"/>
             <a:ext cx="664331" cy="597419"/>
           </a:xfrm>
           <a:prstGeom prst="rect">
@@ -4172,7 +4188,7 @@
         </p:nvSpPr>
         <p:spPr>
           <a:xfrm>
-            <a:off x="2843808" y="3968203"/>
+            <a:off x="3419872" y="3968203"/>
             <a:ext cx="1008112" cy="396901"/>
           </a:xfrm>
           <a:prstGeom prst="rect">
@@ -4230,7 +4246,7 @@
         </p:nvSpPr>
         <p:spPr>
           <a:xfrm>
-            <a:off x="2569516" y="3509392"/>
+            <a:off x="3145580" y="3509392"/>
             <a:ext cx="1210396" cy="523220"/>
           </a:xfrm>
           <a:prstGeom prst="rect">
@@ -4279,7 +4295,7 @@
         </p:nvSpPr>
         <p:spPr>
           <a:xfrm>
-            <a:off x="1343909" y="3395547"/>
+            <a:off x="1919973" y="3395547"/>
             <a:ext cx="1499899" cy="1692188"/>
           </a:xfrm>
           <a:prstGeom prst="rect">
@@ -4322,7 +4338,7 @@
         </p:nvSpPr>
         <p:spPr>
           <a:xfrm>
-            <a:off x="1345380" y="3356992"/>
+            <a:off x="1921444" y="3356992"/>
             <a:ext cx="1210396" cy="523220"/>
           </a:xfrm>
           <a:prstGeom prst="rect">
@@ -4371,7 +4387,7 @@
         </p:nvSpPr>
         <p:spPr>
           <a:xfrm>
-            <a:off x="1775957" y="4367655"/>
+            <a:off x="2352021" y="4367655"/>
             <a:ext cx="664331" cy="597419"/>
           </a:xfrm>
           <a:prstGeom prst="rect">
@@ -4427,7 +4443,7 @@
         </p:nvSpPr>
         <p:spPr>
           <a:xfrm>
-            <a:off x="1619672" y="3867352"/>
+            <a:off x="2195736" y="3867352"/>
             <a:ext cx="1008112" cy="396901"/>
           </a:xfrm>
           <a:prstGeom prst="rect">
@@ -4485,7 +4501,7 @@
         </p:nvSpPr>
         <p:spPr>
           <a:xfrm>
-            <a:off x="2555776" y="3789040"/>
+            <a:off x="3131840" y="3789040"/>
             <a:ext cx="156118" cy="244670"/>
           </a:xfrm>
           <a:prstGeom prst="arc">
@@ -4534,7 +4550,7 @@
         </p:nvCxnSpPr>
         <p:spPr>
           <a:xfrm rot="10800000">
-            <a:off x="1625807" y="4264253"/>
+            <a:off x="2201871" y="4264253"/>
             <a:ext cx="150150" cy="402112"/>
           </a:xfrm>
           <a:prstGeom prst="bentConnector2">
@@ -4567,7 +4583,7 @@
         </p:nvSpPr>
         <p:spPr>
           <a:xfrm>
-            <a:off x="2474415" y="4555728"/>
+            <a:off x="3050479" y="4555728"/>
             <a:ext cx="585417" cy="553998"/>
           </a:xfrm>
           <a:prstGeom prst="rect">
@@ -4625,7 +4641,7 @@
         </p:nvCxnSpPr>
         <p:spPr>
           <a:xfrm>
-            <a:off x="2446740" y="4438627"/>
+            <a:off x="3022804" y="4438627"/>
             <a:ext cx="524831" cy="0"/>
           </a:xfrm>
           <a:prstGeom prst="straightConnector1">
@@ -4661,7 +4677,7 @@
         </p:nvCxnSpPr>
         <p:spPr>
           <a:xfrm flipH="1">
-            <a:off x="2427143" y="4582643"/>
+            <a:off x="3003207" y="4582643"/>
             <a:ext cx="544428" cy="0"/>
           </a:xfrm>
           <a:prstGeom prst="straightConnector1">
@@ -4697,7 +4713,7 @@
         </p:nvSpPr>
         <p:spPr>
           <a:xfrm>
-            <a:off x="3711251" y="4699744"/>
+            <a:off x="4287315" y="4699744"/>
             <a:ext cx="585417" cy="553998"/>
           </a:xfrm>
           <a:prstGeom prst="rect">
@@ -4755,7 +4771,7 @@
         </p:nvCxnSpPr>
         <p:spPr>
           <a:xfrm>
-            <a:off x="3711992" y="4581128"/>
+            <a:off x="4288056" y="4581128"/>
             <a:ext cx="524831" cy="0"/>
           </a:xfrm>
           <a:prstGeom prst="straightConnector1">
@@ -4791,7 +4807,7 @@
         </p:nvCxnSpPr>
         <p:spPr>
           <a:xfrm flipH="1">
-            <a:off x="3692395" y="4725144"/>
+            <a:off x="4268459" y="4725144"/>
             <a:ext cx="544428" cy="0"/>
           </a:xfrm>
           <a:prstGeom prst="straightConnector1">
@@ -4827,7 +4843,7 @@
         </p:nvSpPr>
         <p:spPr>
           <a:xfrm>
-            <a:off x="1115616" y="2540966"/>
+            <a:off x="1691680" y="2540966"/>
             <a:ext cx="5616624" cy="311969"/>
           </a:xfrm>
           <a:prstGeom prst="rect">
@@ -4876,7 +4892,7 @@
         </p:nvSpPr>
         <p:spPr>
           <a:xfrm>
-            <a:off x="1128316" y="2545159"/>
+            <a:off x="1704380" y="2545159"/>
             <a:ext cx="1593065" cy="307777"/>
           </a:xfrm>
           <a:prstGeom prst="rect">
@@ -4910,7 +4926,7 @@
         </p:nvSpPr>
         <p:spPr>
           <a:xfrm>
-            <a:off x="2627784" y="260648"/>
+            <a:off x="3203848" y="260648"/>
             <a:ext cx="1430135" cy="307777"/>
           </a:xfrm>
           <a:prstGeom prst="rect">
@@ -4940,7 +4956,7 @@
         </p:nvSpPr>
         <p:spPr>
           <a:xfrm>
-            <a:off x="943474" y="2204864"/>
+            <a:off x="1519538" y="2204864"/>
             <a:ext cx="5941166" cy="4392488"/>
           </a:xfrm>
           <a:prstGeom prst="rect">
@@ -4984,7 +5000,7 @@
         </p:nvSpPr>
         <p:spPr>
           <a:xfrm>
-            <a:off x="4932040" y="2204864"/>
+            <a:off x="5508104" y="2204864"/>
             <a:ext cx="1981696" cy="307777"/>
           </a:xfrm>
           <a:prstGeom prst="rect">
@@ -5014,7 +5030,7 @@
         </p:nvSpPr>
         <p:spPr>
           <a:xfrm>
-            <a:off x="3767810" y="3861048"/>
+            <a:off x="4343874" y="3861048"/>
             <a:ext cx="156118" cy="244670"/>
           </a:xfrm>
           <a:prstGeom prst="arc">
@@ -5061,7 +5077,7 @@
         </p:nvSpPr>
         <p:spPr>
           <a:xfrm>
-            <a:off x="4991946" y="4005064"/>
+            <a:off x="5568010" y="4005064"/>
             <a:ext cx="156118" cy="244670"/>
           </a:xfrm>
           <a:prstGeom prst="arc">
@@ -5108,7 +5124,7 @@
         </p:nvSpPr>
         <p:spPr>
           <a:xfrm>
-            <a:off x="1683542" y="595288"/>
+            <a:off x="2259606" y="595288"/>
             <a:ext cx="2193778" cy="1296144"/>
           </a:xfrm>
           <a:prstGeom prst="rect">
@@ -5152,7 +5168,7 @@
         </p:nvSpPr>
         <p:spPr>
           <a:xfrm>
-            <a:off x="1835696" y="1889765"/>
+            <a:off x="2411760" y="1889765"/>
             <a:ext cx="658514" cy="276999"/>
           </a:xfrm>
           <a:prstGeom prst="rect">
@@ -5182,7 +5198,7 @@
         </p:nvSpPr>
         <p:spPr>
           <a:xfrm>
-            <a:off x="4034406" y="595288"/>
+            <a:off x="4610470" y="595288"/>
             <a:ext cx="2193778" cy="1296144"/>
           </a:xfrm>
           <a:prstGeom prst="rect">
@@ -5228,7 +5244,7 @@
         </p:nvCxnSpPr>
         <p:spPr>
           <a:xfrm rot="5400000">
-            <a:off x="3039604" y="2016313"/>
+            <a:off x="3615668" y="2016313"/>
             <a:ext cx="2352583" cy="1552910"/>
           </a:xfrm>
           <a:prstGeom prst="bentConnector3">
@@ -5263,7 +5279,7 @@
         </p:nvSpPr>
         <p:spPr>
           <a:xfrm>
-            <a:off x="4199260" y="1902465"/>
+            <a:off x="4775324" y="1902465"/>
             <a:ext cx="658514" cy="276999"/>
           </a:xfrm>
           <a:prstGeom prst="rect">
@@ -5293,7 +5309,7 @@
         </p:nvSpPr>
         <p:spPr>
           <a:xfrm>
-            <a:off x="4546600" y="1383178"/>
+            <a:off x="5122664" y="1383178"/>
             <a:ext cx="1512168" cy="461646"/>
           </a:xfrm>
           <a:prstGeom prst="rect">
@@ -5347,7 +5363,7 @@
         </p:nvSpPr>
         <p:spPr>
           <a:xfrm>
-            <a:off x="4452290" y="1305009"/>
+            <a:off x="5028354" y="1305009"/>
             <a:ext cx="1512168" cy="461646"/>
           </a:xfrm>
           <a:prstGeom prst="rect">
@@ -5400,7 +5416,7 @@
         </p:nvSpPr>
         <p:spPr>
           <a:xfrm>
-            <a:off x="4338960" y="1233001"/>
+            <a:off x="4915024" y="1233001"/>
             <a:ext cx="1512168" cy="461646"/>
           </a:xfrm>
           <a:prstGeom prst="rect">
@@ -5450,7 +5466,7 @@
         </p:nvSpPr>
         <p:spPr>
           <a:xfrm>
-            <a:off x="4236266" y="1159178"/>
+            <a:off x="4812330" y="1159178"/>
             <a:ext cx="1512168" cy="457299"/>
           </a:xfrm>
           <a:prstGeom prst="rect">
@@ -5508,7 +5524,7 @@
         </p:nvSpPr>
         <p:spPr>
           <a:xfrm>
-            <a:off x="4042544" y="919753"/>
+            <a:off x="4618608" y="919753"/>
             <a:ext cx="1143005" cy="276999"/>
           </a:xfrm>
           <a:prstGeom prst="rect">
@@ -5538,7 +5554,7 @@
         </p:nvSpPr>
         <p:spPr>
           <a:xfrm>
-            <a:off x="4024032" y="595288"/>
+            <a:off x="4600096" y="595288"/>
             <a:ext cx="1242648" cy="276999"/>
           </a:xfrm>
           <a:prstGeom prst="rect">
@@ -5568,7 +5584,7 @@
         </p:nvSpPr>
         <p:spPr>
           <a:xfrm>
-            <a:off x="2195736" y="1357778"/>
+            <a:off x="2771800" y="1357778"/>
             <a:ext cx="1512168" cy="461646"/>
           </a:xfrm>
           <a:prstGeom prst="rect">
@@ -5622,7 +5638,7 @@
         </p:nvSpPr>
         <p:spPr>
           <a:xfrm>
-            <a:off x="2101426" y="1279609"/>
+            <a:off x="2677490" y="1279609"/>
             <a:ext cx="1512168" cy="461646"/>
           </a:xfrm>
           <a:prstGeom prst="rect">
@@ -5675,7 +5691,7 @@
         </p:nvSpPr>
         <p:spPr>
           <a:xfrm>
-            <a:off x="1988096" y="1207601"/>
+            <a:off x="2564160" y="1207601"/>
             <a:ext cx="1512168" cy="461646"/>
           </a:xfrm>
           <a:prstGeom prst="rect">
@@ -5725,7 +5741,7 @@
         </p:nvSpPr>
         <p:spPr>
           <a:xfrm>
-            <a:off x="1885402" y="1133778"/>
+            <a:off x="2461466" y="1133778"/>
             <a:ext cx="1512168" cy="457299"/>
           </a:xfrm>
           <a:prstGeom prst="rect">
@@ -5783,7 +5799,7 @@
         </p:nvSpPr>
         <p:spPr>
           <a:xfrm>
-            <a:off x="1691680" y="894353"/>
+            <a:off x="2267744" y="894353"/>
             <a:ext cx="1143005" cy="276999"/>
           </a:xfrm>
           <a:prstGeom prst="rect">
@@ -5813,7 +5829,7 @@
         </p:nvSpPr>
         <p:spPr>
           <a:xfrm>
-            <a:off x="1673168" y="569888"/>
+            <a:off x="2249232" y="569888"/>
             <a:ext cx="1242648" cy="276999"/>
           </a:xfrm>
           <a:prstGeom prst="rect">
@@ -5845,7 +5861,7 @@
         </p:nvCxnSpPr>
         <p:spPr>
           <a:xfrm rot="5400000">
-            <a:off x="1333006" y="2552563"/>
+            <a:off x="1909070" y="2552563"/>
             <a:ext cx="2269967" cy="346994"/>
           </a:xfrm>
           <a:prstGeom prst="bentConnector3">
@@ -5880,7 +5896,7 @@
         </p:nvSpPr>
         <p:spPr>
           <a:xfrm>
-            <a:off x="3347864" y="1052736"/>
+            <a:off x="3923928" y="1052736"/>
             <a:ext cx="869923" cy="332220"/>
           </a:xfrm>
           <a:prstGeom prst="leftRightArrow">
@@ -5930,7 +5946,7 @@
         </p:nvSpPr>
         <p:spPr>
           <a:xfrm>
-            <a:off x="3554535" y="1265426"/>
+            <a:off x="4130599" y="1265426"/>
             <a:ext cx="585417" cy="553998"/>
           </a:xfrm>
           <a:prstGeom prst="rect">
@@ -5988,7 +6004,7 @@
         </p:nvSpPr>
         <p:spPr>
           <a:xfrm>
-            <a:off x="3275856" y="878523"/>
+            <a:off x="3851920" y="878523"/>
             <a:ext cx="1015021" cy="246221"/>
           </a:xfrm>
           <a:prstGeom prst="rect">
@@ -6026,7 +6042,7 @@
         </p:nvSpPr>
         <p:spPr>
           <a:xfrm>
-            <a:off x="5185549" y="3049215"/>
+            <a:off x="5761613" y="3049215"/>
             <a:ext cx="1457643" cy="307777"/>
           </a:xfrm>
           <a:prstGeom prst="rect">

</xml_diff>